<commit_message>
Mise à jour des cours NoSQL
</commit_message>
<xml_diff>
--- a/mongodb/cours/Cours_NoSQL.pptx
+++ b/mongodb/cours/Cours_NoSQL.pptx
@@ -7134,8 +7134,8 @@
 </file>
 
 <file path=ppt/slideLayouts/slideLayout1.xml><?xml version="1.0" encoding="utf-8"?>
-<p:sldLayout xmlns:a="http://schemas.openxmlformats.org/drawingml/2006/main" xmlns:r="http://schemas.openxmlformats.org/officeDocument/2006/relationships" xmlns:mc="http://schemas.openxmlformats.org/markup-compatibility/2006" xmlns:mv="urn:schemas-microsoft-com:mac:vml" xmlns:p="http://schemas.openxmlformats.org/presentationml/2006/main" xmlns:c="http://schemas.openxmlformats.org/drawingml/2006/chart" xmlns:dgm="http://schemas.openxmlformats.org/drawingml/2006/diagram" xmlns:o="urn:schemas-microsoft-com:office:office" xmlns:v="urn:schemas-microsoft-com:vml" xmlns:pvml="urn:schemas-microsoft-com:office:powerpoint" xmlns:com="http://schemas.openxmlformats.org/drawingml/2006/compatibility" xmlns:p14="http://schemas.microsoft.com/office/powerpoint/2010/main" matchingName="title" type="title">
-  <p:cSld name="title">
+<p:sldLayout xmlns:a="http://schemas.openxmlformats.org/drawingml/2006/main" xmlns:r="http://schemas.openxmlformats.org/officeDocument/2006/relationships" xmlns:mc="http://schemas.openxmlformats.org/markup-compatibility/2006" xmlns:mv="urn:schemas-microsoft-com:mac:vml" xmlns:p="http://schemas.openxmlformats.org/presentationml/2006/main" xmlns:c="http://schemas.openxmlformats.org/drawingml/2006/chart" xmlns:dgm="http://schemas.openxmlformats.org/drawingml/2006/diagram" xmlns:o="urn:schemas-microsoft-com:office:office" xmlns:v="urn:schemas-microsoft-com:vml" xmlns:pvml="urn:schemas-microsoft-com:office:powerpoint" xmlns:com="http://schemas.openxmlformats.org/drawingml/2006/compatibility" xmlns:p14="http://schemas.microsoft.com/office/powerpoint/2010/main" type="title">
+  <p:cSld name="Title Slide">
     <p:spTree>
       <p:nvGrpSpPr>
         <p:cNvPr id="7" name="Shape 7"/>
@@ -7632,8 +7632,8 @@
 </file>
 
 <file path=ppt/slideLayouts/slideLayout2.xml><?xml version="1.0" encoding="utf-8"?>
-<p:sldLayout xmlns:a="http://schemas.openxmlformats.org/drawingml/2006/main" xmlns:r="http://schemas.openxmlformats.org/officeDocument/2006/relationships" xmlns:mc="http://schemas.openxmlformats.org/markup-compatibility/2006" xmlns:mv="urn:schemas-microsoft-com:mac:vml" xmlns:p="http://schemas.openxmlformats.org/presentationml/2006/main" xmlns:c="http://schemas.openxmlformats.org/drawingml/2006/chart" xmlns:dgm="http://schemas.openxmlformats.org/drawingml/2006/diagram" xmlns:o="urn:schemas-microsoft-com:office:office" xmlns:v="urn:schemas-microsoft-com:vml" xmlns:pvml="urn:schemas-microsoft-com:office:powerpoint" xmlns:com="http://schemas.openxmlformats.org/drawingml/2006/compatibility" xmlns:p14="http://schemas.microsoft.com/office/powerpoint/2010/main" matchingName="tx" type="tx">
-  <p:cSld name="tx">
+<p:sldLayout xmlns:a="http://schemas.openxmlformats.org/drawingml/2006/main" xmlns:r="http://schemas.openxmlformats.org/officeDocument/2006/relationships" xmlns:mc="http://schemas.openxmlformats.org/markup-compatibility/2006" xmlns:mv="urn:schemas-microsoft-com:mac:vml" xmlns:p="http://schemas.openxmlformats.org/presentationml/2006/main" xmlns:c="http://schemas.openxmlformats.org/drawingml/2006/chart" xmlns:dgm="http://schemas.openxmlformats.org/drawingml/2006/diagram" xmlns:o="urn:schemas-microsoft-com:office:office" xmlns:v="urn:schemas-microsoft-com:vml" xmlns:pvml="urn:schemas-microsoft-com:office:powerpoint" xmlns:com="http://schemas.openxmlformats.org/drawingml/2006/compatibility" xmlns:p14="http://schemas.microsoft.com/office/powerpoint/2010/main" type="tx">
+  <p:cSld name="Title and Body">
     <p:spTree>
       <p:nvGrpSpPr>
         <p:cNvPr id="12" name="Shape 12"/>
@@ -7824,8 +7824,8 @@
 </file>
 
 <file path=ppt/slideLayouts/slideLayout3.xml><?xml version="1.0" encoding="utf-8"?>
-<p:sldLayout xmlns:a="http://schemas.openxmlformats.org/drawingml/2006/main" xmlns:r="http://schemas.openxmlformats.org/officeDocument/2006/relationships" xmlns:mc="http://schemas.openxmlformats.org/markup-compatibility/2006" xmlns:mv="urn:schemas-microsoft-com:mac:vml" xmlns:p="http://schemas.openxmlformats.org/presentationml/2006/main" xmlns:c="http://schemas.openxmlformats.org/drawingml/2006/chart" xmlns:dgm="http://schemas.openxmlformats.org/drawingml/2006/diagram" xmlns:o="urn:schemas-microsoft-com:office:office" xmlns:v="urn:schemas-microsoft-com:vml" xmlns:pvml="urn:schemas-microsoft-com:office:powerpoint" xmlns:com="http://schemas.openxmlformats.org/drawingml/2006/compatibility" xmlns:p14="http://schemas.microsoft.com/office/powerpoint/2010/main" matchingName="twoColTx" type="twoColTx">
-  <p:cSld name="twoColTx">
+<p:sldLayout xmlns:a="http://schemas.openxmlformats.org/drawingml/2006/main" xmlns:r="http://schemas.openxmlformats.org/officeDocument/2006/relationships" xmlns:mc="http://schemas.openxmlformats.org/markup-compatibility/2006" xmlns:mv="urn:schemas-microsoft-com:mac:vml" xmlns:p="http://schemas.openxmlformats.org/presentationml/2006/main" xmlns:c="http://schemas.openxmlformats.org/drawingml/2006/chart" xmlns:dgm="http://schemas.openxmlformats.org/drawingml/2006/diagram" xmlns:o="urn:schemas-microsoft-com:office:office" xmlns:v="urn:schemas-microsoft-com:vml" xmlns:pvml="urn:schemas-microsoft-com:office:powerpoint" xmlns:com="http://schemas.openxmlformats.org/drawingml/2006/compatibility" xmlns:p14="http://schemas.microsoft.com/office/powerpoint/2010/main" type="twoColTx">
+  <p:cSld name="Title and Two Columns">
     <p:spTree>
       <p:nvGrpSpPr>
         <p:cNvPr id="17" name="Shape 17"/>
@@ -8197,8 +8197,8 @@
 </file>
 
 <file path=ppt/slideLayouts/slideLayout4.xml><?xml version="1.0" encoding="utf-8"?>
-<p:sldLayout xmlns:a="http://schemas.openxmlformats.org/drawingml/2006/main" xmlns:r="http://schemas.openxmlformats.org/officeDocument/2006/relationships" xmlns:mc="http://schemas.openxmlformats.org/markup-compatibility/2006" xmlns:mv="urn:schemas-microsoft-com:mac:vml" xmlns:p="http://schemas.openxmlformats.org/presentationml/2006/main" xmlns:c="http://schemas.openxmlformats.org/drawingml/2006/chart" xmlns:dgm="http://schemas.openxmlformats.org/drawingml/2006/diagram" xmlns:o="urn:schemas-microsoft-com:office:office" xmlns:v="urn:schemas-microsoft-com:vml" xmlns:pvml="urn:schemas-microsoft-com:office:powerpoint" xmlns:com="http://schemas.openxmlformats.org/drawingml/2006/compatibility" xmlns:p14="http://schemas.microsoft.com/office/powerpoint/2010/main" matchingName="titleOnly" type="titleOnly">
-  <p:cSld name="titleOnly">
+<p:sldLayout xmlns:a="http://schemas.openxmlformats.org/drawingml/2006/main" xmlns:r="http://schemas.openxmlformats.org/officeDocument/2006/relationships" xmlns:mc="http://schemas.openxmlformats.org/markup-compatibility/2006" xmlns:mv="urn:schemas-microsoft-com:mac:vml" xmlns:p="http://schemas.openxmlformats.org/presentationml/2006/main" xmlns:c="http://schemas.openxmlformats.org/drawingml/2006/chart" xmlns:dgm="http://schemas.openxmlformats.org/drawingml/2006/diagram" xmlns:o="urn:schemas-microsoft-com:office:office" xmlns:v="urn:schemas-microsoft-com:vml" xmlns:pvml="urn:schemas-microsoft-com:office:powerpoint" xmlns:com="http://schemas.openxmlformats.org/drawingml/2006/compatibility" xmlns:p14="http://schemas.microsoft.com/office/powerpoint/2010/main" type="titleOnly">
+  <p:cSld name="Title Only">
     <p:spTree>
       <p:nvGrpSpPr>
         <p:cNvPr id="23" name="Shape 23"/>
@@ -8460,8 +8460,8 @@
 </file>
 
 <file path=ppt/slideLayouts/slideLayout5.xml><?xml version="1.0" encoding="utf-8"?>
-<p:sldLayout xmlns:a="http://schemas.openxmlformats.org/drawingml/2006/main" xmlns:r="http://schemas.openxmlformats.org/officeDocument/2006/relationships" xmlns:mc="http://schemas.openxmlformats.org/markup-compatibility/2006" xmlns:mv="urn:schemas-microsoft-com:mac:vml" xmlns:p="http://schemas.openxmlformats.org/presentationml/2006/main" xmlns:c="http://schemas.openxmlformats.org/drawingml/2006/chart" xmlns:dgm="http://schemas.openxmlformats.org/drawingml/2006/diagram" xmlns:o="urn:schemas-microsoft-com:office:office" xmlns:v="urn:schemas-microsoft-com:vml" xmlns:pvml="urn:schemas-microsoft-com:office:powerpoint" xmlns:com="http://schemas.openxmlformats.org/drawingml/2006/compatibility" xmlns:p14="http://schemas.microsoft.com/office/powerpoint/2010/main" matchingName="CAPTION_ONLY">
-  <p:cSld name="CAPTION_ONLY">
+<p:sldLayout xmlns:a="http://schemas.openxmlformats.org/drawingml/2006/main" xmlns:r="http://schemas.openxmlformats.org/officeDocument/2006/relationships" xmlns:mc="http://schemas.openxmlformats.org/markup-compatibility/2006" xmlns:mv="urn:schemas-microsoft-com:mac:vml" xmlns:p="http://schemas.openxmlformats.org/presentationml/2006/main" xmlns:c="http://schemas.openxmlformats.org/drawingml/2006/chart" xmlns:dgm="http://schemas.openxmlformats.org/drawingml/2006/diagram" xmlns:o="urn:schemas-microsoft-com:office:office" xmlns:v="urn:schemas-microsoft-com:vml" xmlns:pvml="urn:schemas-microsoft-com:office:powerpoint" xmlns:com="http://schemas.openxmlformats.org/drawingml/2006/compatibility" xmlns:p14="http://schemas.microsoft.com/office/powerpoint/2010/main">
+  <p:cSld name="Caption">
     <p:spTree>
       <p:nvGrpSpPr>
         <p:cNvPr id="27" name="Shape 27"/>
@@ -8768,8 +8768,8 @@
 </file>
 
 <file path=ppt/slideLayouts/slideLayout6.xml><?xml version="1.0" encoding="utf-8"?>
-<p:sldLayout xmlns:a="http://schemas.openxmlformats.org/drawingml/2006/main" xmlns:r="http://schemas.openxmlformats.org/officeDocument/2006/relationships" xmlns:mc="http://schemas.openxmlformats.org/markup-compatibility/2006" xmlns:mv="urn:schemas-microsoft-com:mac:vml" xmlns:p="http://schemas.openxmlformats.org/presentationml/2006/main" xmlns:c="http://schemas.openxmlformats.org/drawingml/2006/chart" xmlns:dgm="http://schemas.openxmlformats.org/drawingml/2006/diagram" xmlns:o="urn:schemas-microsoft-com:office:office" xmlns:v="urn:schemas-microsoft-com:vml" xmlns:pvml="urn:schemas-microsoft-com:office:powerpoint" xmlns:com="http://schemas.openxmlformats.org/drawingml/2006/compatibility" xmlns:p14="http://schemas.microsoft.com/office/powerpoint/2010/main" matchingName="blank" type="blank">
-  <p:cSld name="blank">
+<p:sldLayout xmlns:a="http://schemas.openxmlformats.org/drawingml/2006/main" xmlns:r="http://schemas.openxmlformats.org/officeDocument/2006/relationships" xmlns:mc="http://schemas.openxmlformats.org/markup-compatibility/2006" xmlns:mv="urn:schemas-microsoft-com:mac:vml" xmlns:p="http://schemas.openxmlformats.org/presentationml/2006/main" xmlns:c="http://schemas.openxmlformats.org/drawingml/2006/chart" xmlns:dgm="http://schemas.openxmlformats.org/drawingml/2006/diagram" xmlns:o="urn:schemas-microsoft-com:office:office" xmlns:v="urn:schemas-microsoft-com:vml" xmlns:pvml="urn:schemas-microsoft-com:office:powerpoint" xmlns:com="http://schemas.openxmlformats.org/drawingml/2006/compatibility" xmlns:p14="http://schemas.microsoft.com/office/powerpoint/2010/main" type="blank">
+  <p:cSld name="Blank">
     <p:bg>
       <p:bgPr>
         <a:solidFill>
@@ -17406,7 +17406,7 @@
                 <a:cs typeface="Ubuntu"/>
                 <a:sym typeface="Ubuntu"/>
               </a:rPr>
-              <a:t>Le fonctionnement interne est très proche de ce qui a été vu avec MySQL ... Optimiseur de requêtes, plan d'exécution.</a:t>
+              <a:t>Le fonctionnement interne est très proche de ce que l’on trouve dans les SGBD actuels.</a:t>
             </a:r>
           </a:p>
         </p:txBody>
@@ -17812,30 +17812,6 @@
             <a:r>
               <a:rPr sz="2400" lang="fr">
                 <a:solidFill>
-                  <a:srgbClr val="222222"/>
-                </a:solidFill>
-                <a:latin typeface="Ubuntu"/>
-                <a:ea typeface="Ubuntu"/>
-                <a:cs typeface="Ubuntu"/>
-                <a:sym typeface="Ubuntu"/>
-              </a:rPr>
-              <a:t>coll</a:t>
-            </a:r>
-            <a:r>
-              <a:rPr sz="2400" lang="fr">
-                <a:solidFill>
-                  <a:srgbClr val="666666"/>
-                </a:solidFill>
-                <a:latin typeface="Ubuntu"/>
-                <a:ea typeface="Ubuntu"/>
-                <a:cs typeface="Ubuntu"/>
-                <a:sym typeface="Ubuntu"/>
-              </a:rPr>
-              <a:t>.</a:t>
-            </a:r>
-            <a:r>
-              <a:rPr sz="2400" lang="fr">
-                <a:solidFill>
                   <a:srgbClr val="4070A0"/>
                 </a:solidFill>
                 <a:latin typeface="Ubuntu"/>
@@ -19563,12 +19539,18 @@
           </a:p>
         </p:txBody>
       </p:sp>
-      <p:sp>
-        <p:nvSpPr>
+      <p:pic>
+        <p:nvPicPr>
           <p:cNvPr id="275" name="Shape 275"/>
-          <p:cNvSpPr/>
+          <p:cNvPicPr preferRelativeResize="0"/>
           <p:nvPr/>
-        </p:nvSpPr>
+        </p:nvPicPr>
+        <p:blipFill>
+          <a:blip r:embed="rId3"/>
+          <a:stretch>
+            <a:fillRect/>
+          </a:stretch>
+        </p:blipFill>
         <p:spPr>
           <a:xfrm>
             <a:off y="1454952" x="0"/>
@@ -19577,17 +19559,12 @@
           <a:prstGeom prst="rect">
             <a:avLst/>
           </a:prstGeom>
-          <a:blipFill>
-            <a:blip r:embed="rId3"/>
-            <a:stretch>
-              <a:fillRect/>
-            </a:stretch>
-          </a:blipFill>
+          <a:noFill/>
           <a:ln>
             <a:noFill/>
           </a:ln>
         </p:spPr>
-      </p:sp>
+      </p:pic>
     </p:spTree>
   </p:cSld>
   <p:clrMapOvr>
@@ -21782,7 +21759,7 @@
                 <a:cs typeface="Ubuntu"/>
                 <a:sym typeface="Ubuntu"/>
               </a:rPr>
-              <a:t>Synchrone : Bloquant / Couteux / Forte cohérence</a:t>
+              <a:t>Synchrone : Bloquant / Coûteux / Forte cohérence</a:t>
             </a:r>
           </a:p>
           <a:p>
@@ -21801,7 +21778,7 @@
                 <a:cs typeface="Ubuntu"/>
                 <a:sym typeface="Ubuntu"/>
               </a:rPr>
-              <a:t>Asynchrone : Non bloquant / Rafraichissement des données obligatoires.</a:t>
+              <a:t>Asynchrone : Non bloquant / Rafraîchissement des données obligatoires.</a:t>
             </a:r>
           </a:p>
           <a:p>
@@ -23222,7 +23199,7 @@
                 <a:cs typeface="Ubuntu"/>
                 <a:sym typeface="Ubuntu"/>
               </a:rPr>
-              <a:t>Les lectures sur le noeuds secondaires améliorent le débit de lecture en distribuant les lectures.</a:t>
+              <a:t>Les lectures sur les noeuds secondaires améliorent le débit de lecture en distribuant les lectures.</a:t>
             </a:r>
           </a:p>
         </p:txBody>
@@ -24510,12 +24487,18 @@
           </a:p>
         </p:txBody>
       </p:sp>
-      <p:sp>
-        <p:nvSpPr>
+      <p:pic>
+        <p:nvPicPr>
           <p:cNvPr id="458" name="Shape 458"/>
-          <p:cNvSpPr/>
+          <p:cNvPicPr preferRelativeResize="0"/>
           <p:nvPr/>
-        </p:nvSpPr>
+        </p:nvPicPr>
+        <p:blipFill>
+          <a:blip r:embed="rId3"/>
+          <a:stretch>
+            <a:fillRect/>
+          </a:stretch>
+        </p:blipFill>
         <p:spPr>
           <a:xfrm>
             <a:off y="1527350" x="958983"/>
@@ -24524,17 +24507,12 @@
           <a:prstGeom prst="rect">
             <a:avLst/>
           </a:prstGeom>
-          <a:blipFill>
-            <a:blip r:embed="rId3"/>
-            <a:stretch>
-              <a:fillRect/>
-            </a:stretch>
-          </a:blipFill>
+          <a:noFill/>
           <a:ln>
             <a:noFill/>
           </a:ln>
         </p:spPr>
-      </p:sp>
+      </p:pic>
     </p:spTree>
   </p:cSld>
   <p:clrMapOvr>
@@ -26445,9 +26423,9 @@
 </file>
 
 <file path=ppt/theme/theme1.xml><?xml version="1.0" encoding="utf-8"?>
-<a:theme xmlns:a="http://schemas.openxmlformats.org/drawingml/2006/main" xmlns:r="http://schemas.openxmlformats.org/officeDocument/2006/relationships">
+<a:theme xmlns:a="http://schemas.openxmlformats.org/drawingml/2006/main" xmlns:r="http://schemas.openxmlformats.org/officeDocument/2006/relationships" name="Custom Theme">
   <a:themeElements>
-    <a:clrScheme name="Default">
+    <a:clrScheme name="Custom 233">
       <a:dk1>
         <a:srgbClr val="000000"/>
       </a:dk1>
@@ -26455,34 +26433,34 @@
         <a:srgbClr val="FFFFFF"/>
       </a:lt1>
       <a:dk2>
-        <a:srgbClr val="158158"/>
+        <a:srgbClr val="2388DB"/>
       </a:dk2>
       <a:lt2>
-        <a:srgbClr val="F3F3F3"/>
+        <a:srgbClr val="BBD7F8"/>
       </a:lt2>
       <a:accent1>
-        <a:srgbClr val="058DC7"/>
+        <a:srgbClr val="80B606"/>
       </a:accent1>
       <a:accent2>
-        <a:srgbClr val="50B432"/>
+        <a:srgbClr val="E29F1D"/>
       </a:accent2>
       <a:accent3>
-        <a:srgbClr val="ED561B"/>
+        <a:srgbClr val="1D6FB2"/>
       </a:accent3>
       <a:accent4>
-        <a:srgbClr val="EDEF00"/>
+        <a:srgbClr val="3FAC98"/>
       </a:accent4>
       <a:accent5>
-        <a:srgbClr val="24CBE5"/>
+        <a:srgbClr val="5B57BB"/>
       </a:accent5>
       <a:accent6>
-        <a:srgbClr val="64E572"/>
+        <a:srgbClr val="D1505E"/>
       </a:accent6>
       <a:hlink>
-        <a:srgbClr val="2200CC"/>
+        <a:srgbClr val="185DA2"/>
       </a:hlink>
       <a:folHlink>
-        <a:srgbClr val="551A8B"/>
+        <a:srgbClr val="00487B"/>
       </a:folHlink>
     </a:clrScheme>
     <a:fontScheme name="Office">
@@ -27040,9 +27018,9 @@
 </file>
 
 <file path=ppt/theme/theme3.xml><?xml version="1.0" encoding="utf-8"?>
-<a:theme xmlns:a="http://schemas.openxmlformats.org/drawingml/2006/main" xmlns:r="http://schemas.openxmlformats.org/officeDocument/2006/relationships">
+<a:theme xmlns:a="http://schemas.openxmlformats.org/drawingml/2006/main" xmlns:r="http://schemas.openxmlformats.org/officeDocument/2006/relationships" name="Custom Theme">
   <a:themeElements>
-    <a:clrScheme name="Custom 233">
+    <a:clrScheme name="Default">
       <a:dk1>
         <a:srgbClr val="000000"/>
       </a:dk1>
@@ -27050,34 +27028,34 @@
         <a:srgbClr val="FFFFFF"/>
       </a:lt1>
       <a:dk2>
-        <a:srgbClr val="2388DB"/>
+        <a:srgbClr val="158158"/>
       </a:dk2>
       <a:lt2>
-        <a:srgbClr val="BBD7F8"/>
+        <a:srgbClr val="F3F3F3"/>
       </a:lt2>
       <a:accent1>
-        <a:srgbClr val="80B606"/>
+        <a:srgbClr val="058DC7"/>
       </a:accent1>
       <a:accent2>
-        <a:srgbClr val="E29F1D"/>
+        <a:srgbClr val="50B432"/>
       </a:accent2>
       <a:accent3>
-        <a:srgbClr val="1D6FB2"/>
+        <a:srgbClr val="ED561B"/>
       </a:accent3>
       <a:accent4>
-        <a:srgbClr val="3FAC98"/>
+        <a:srgbClr val="EDEF00"/>
       </a:accent4>
       <a:accent5>
-        <a:srgbClr val="5B57BB"/>
+        <a:srgbClr val="24CBE5"/>
       </a:accent5>
       <a:accent6>
-        <a:srgbClr val="D1505E"/>
+        <a:srgbClr val="64E572"/>
       </a:accent6>
       <a:hlink>
-        <a:srgbClr val="185DA2"/>
+        <a:srgbClr val="2200CC"/>
       </a:hlink>
       <a:folHlink>
-        <a:srgbClr val="00487B"/>
+        <a:srgbClr val="551A8B"/>
       </a:folHlink>
     </a:clrScheme>
     <a:fontScheme name="Office">

</xml_diff>